<commit_message>
NUB for lighting added
</commit_message>
<xml_diff>
--- a/6020_Graph_2/D2D/Week_08_Uniform_Blocks/UniformBlocks.pptx
+++ b/6020_Graph_2/D2D/Week_08_Uniform_Blocks/UniformBlocks.pptx
@@ -4239,14 +4239,14 @@
           <p:cNvCxnSpPr>
             <a:cxnSpLocks/>
             <a:stCxn id="10" idx="1"/>
-            <a:endCxn id="3" idx="3"/>
+            <a:endCxn id="25" idx="3"/>
           </p:cNvCxnSpPr>
           <p:nvPr/>
         </p:nvCxnSpPr>
         <p:spPr>
-          <a:xfrm flipH="1" flipV="1">
-            <a:off x="6849864" y="2432304"/>
-            <a:ext cx="1215144" cy="146304"/>
+          <a:xfrm flipH="1">
+            <a:off x="6781283" y="2578608"/>
+            <a:ext cx="1283725" cy="921872"/>
           </a:xfrm>
           <a:prstGeom prst="straightConnector1">
             <a:avLst/>
@@ -4336,7 +4336,7 @@
           </p:cNvPr>
           <p:cNvCxnSpPr>
             <a:cxnSpLocks/>
-            <a:stCxn id="3" idx="1"/>
+            <a:stCxn id="25" idx="1"/>
             <a:endCxn id="9" idx="3"/>
           </p:cNvCxnSpPr>
           <p:nvPr/>
@@ -4344,7 +4344,7 @@
         <p:spPr>
           <a:xfrm flipH="1" flipV="1">
             <a:off x="3205708" y="2358200"/>
-            <a:ext cx="1074692" cy="74104"/>
+            <a:ext cx="1006111" cy="1142280"/>
           </a:xfrm>
           <a:prstGeom prst="straightConnector1">
             <a:avLst/>
@@ -6376,14 +6376,26 @@
             <a:pPr lvl="1"/>
             <a:r>
               <a:rPr lang="en-CA" dirty="0"/>
-              <a:t>Use std140</a:t>
+              <a:t>Use </a:t>
+            </a:r>
+            <a:r>
+              <a:rPr lang="en-CA" b="1" dirty="0"/>
+              <a:t>std140</a:t>
             </a:r>
           </a:p>
           <a:p>
             <a:pPr lvl="1"/>
             <a:r>
               <a:rPr lang="en-CA" dirty="0"/>
-              <a:t>Also use vec4 whenever possible (even if you think you are “wasting space”)</a:t>
+              <a:t>Also use </a:t>
+            </a:r>
+            <a:r>
+              <a:rPr lang="en-CA" b="1" dirty="0"/>
+              <a:t>vec4</a:t>
+            </a:r>
+            <a:r>
+              <a:rPr lang="en-CA" dirty="0"/>
+              <a:t> whenever possible (even if you think you are “wasting space”)</a:t>
             </a:r>
           </a:p>
           <a:p>

</xml_diff>